<commit_message>
timimg genfunc-fibonacci.pptx, comments on muq8 probs
</commit_message>
<xml_diff>
--- a/spring13/slides13/genfunc-fibonacci.pptx
+++ b/spring13/slides13/genfunc-fibonacci.pptx
@@ -3675,12 +3675,12 @@
           <a:p>
             <a:pPr algn="ctr"/>
             <a:r>
-              <a:rPr lang="en-US" sz="5400" b="1" dirty="0">
+              <a:rPr lang="en-US" sz="5400" b="1" dirty="0" smtClean="0">
                 <a:solidFill>
                   <a:schemeClr val="tx2"/>
                 </a:solidFill>
               </a:rPr>
-              <a:t>Generating </a:t>
+              <a:t>Closed Form </a:t>
             </a:r>
             <a:r>
               <a:rPr lang="en-US" sz="5400" b="1" dirty="0" smtClean="0">
@@ -3688,23 +3688,7 @@
                   <a:schemeClr val="tx2"/>
                 </a:solidFill>
               </a:rPr>
-              <a:t>Function </a:t>
-            </a:r>
-            <a:r>
-              <a:rPr lang="en-US" sz="5400" b="1" smtClean="0">
-                <a:solidFill>
-                  <a:schemeClr val="tx2"/>
-                </a:solidFill>
-              </a:rPr>
-              <a:t>for Fibonacci </a:t>
-            </a:r>
-            <a:r>
-              <a:rPr lang="en-US" sz="5400" b="1" dirty="0" smtClean="0">
-                <a:solidFill>
-                  <a:schemeClr val="tx2"/>
-                </a:solidFill>
-              </a:rPr>
-              <a:t>Recurrence</a:t>
+              <a:t>for Fibonacci Recurrence</a:t>
             </a:r>
           </a:p>
         </p:txBody>
@@ -4077,7 +4061,7 @@
           <a:graphicData uri="http://schemas.openxmlformats.org/presentationml/2006/ole">
             <mc:AlternateContent xmlns:mc="http://schemas.openxmlformats.org/markup-compatibility/2006">
               <mc:Choice xmlns:v="urn:schemas-microsoft-com:vml" Requires="v">
-                <p:oleObj spid="_x0000_s66640" name="Equation" r:id="rId4" imgW="5664200" imgH="1066800" progId="Equation.DSMT4">
+                <p:oleObj spid="_x0000_s66643" name="Equation" r:id="rId4" imgW="5664200" imgH="1066800" progId="Equation.DSMT4">
                   <p:embed/>
                 </p:oleObj>
               </mc:Choice>
@@ -4201,7 +4185,7 @@
           <a:graphicData uri="http://schemas.openxmlformats.org/presentationml/2006/ole">
             <mc:AlternateContent xmlns:mc="http://schemas.openxmlformats.org/markup-compatibility/2006">
               <mc:Choice xmlns:v="urn:schemas-microsoft-com:vml" Requires="v">
-                <p:oleObj spid="_x0000_s66641" name="Equation" r:id="rId6" imgW="5219700" imgH="1663700" progId="Equation.DSMT4">
+                <p:oleObj spid="_x0000_s66644" name="Equation" r:id="rId6" imgW="5219700" imgH="1663700" progId="Equation.DSMT4">
                   <p:embed/>
                 </p:oleObj>
               </mc:Choice>
@@ -4673,7 +4657,7 @@
           <a:graphicData uri="http://schemas.openxmlformats.org/presentationml/2006/ole">
             <mc:AlternateContent xmlns:mc="http://schemas.openxmlformats.org/markup-compatibility/2006">
               <mc:Choice xmlns:v="urn:schemas-microsoft-com:vml" Requires="v">
-                <p:oleObj spid="_x0000_s67684" name="Equation" r:id="rId4" imgW="7175500" imgH="1587500" progId="Equation.DSMT4">
+                <p:oleObj spid="_x0000_s67688" name="Equation" r:id="rId4" imgW="7175500" imgH="1587500" progId="Equation.DSMT4">
                   <p:embed/>
                 </p:oleObj>
               </mc:Choice>
@@ -4743,7 +4727,7 @@
           <a:graphicData uri="http://schemas.openxmlformats.org/presentationml/2006/ole">
             <mc:AlternateContent xmlns:mc="http://schemas.openxmlformats.org/markup-compatibility/2006">
               <mc:Choice xmlns:v="urn:schemas-microsoft-com:vml" Requires="v">
-                <p:oleObj spid="_x0000_s67685" name="Equation" r:id="rId6" imgW="5829300" imgH="863600" progId="Equation.DSMT4">
+                <p:oleObj spid="_x0000_s67689" name="Equation" r:id="rId6" imgW="5829300" imgH="863600" progId="Equation.DSMT4">
                   <p:embed/>
                 </p:oleObj>
               </mc:Choice>
@@ -4931,7 +4915,7 @@
             <a:graphicData uri="http://schemas.openxmlformats.org/presentationml/2006/ole">
               <mc:AlternateContent xmlns:mc="http://schemas.openxmlformats.org/markup-compatibility/2006">
                 <mc:Choice xmlns:v="urn:schemas-microsoft-com:vml" Requires="v">
-                  <p:oleObj spid="_x0000_s67686" name="Equation" r:id="rId8" imgW="2768600" imgH="571500" progId="Equation.DSMT4">
+                  <p:oleObj spid="_x0000_s67690" name="Equation" r:id="rId8" imgW="2768600" imgH="571500" progId="Equation.DSMT4">
                     <p:embed/>
                   </p:oleObj>
                 </mc:Choice>
@@ -5529,7 +5513,7 @@
           <a:graphicData uri="http://schemas.openxmlformats.org/presentationml/2006/ole">
             <mc:AlternateContent xmlns:mc="http://schemas.openxmlformats.org/markup-compatibility/2006">
               <mc:Choice xmlns:v="urn:schemas-microsoft-com:vml" Requires="v">
-                <p:oleObj spid="_x0000_s109618" name="Equation" r:id="rId4" imgW="6807200" imgH="2082800" progId="Equation.DSMT4">
+                <p:oleObj spid="_x0000_s109621" name="Equation" r:id="rId4" imgW="6807200" imgH="2082800" progId="Equation.DSMT4">
                   <p:embed/>
                 </p:oleObj>
               </mc:Choice>
@@ -5599,7 +5583,7 @@
           <a:graphicData uri="http://schemas.openxmlformats.org/presentationml/2006/ole">
             <mc:AlternateContent xmlns:mc="http://schemas.openxmlformats.org/markup-compatibility/2006">
               <mc:Choice xmlns:v="urn:schemas-microsoft-com:vml" Requires="v">
-                <p:oleObj spid="_x0000_s109619" name="Equation" r:id="rId6" imgW="2463800" imgH="965200" progId="Equation.DSMT4">
+                <p:oleObj spid="_x0000_s109622" name="Equation" r:id="rId6" imgW="2463800" imgH="965200" progId="Equation.DSMT4">
                   <p:embed/>
                 </p:oleObj>
               </mc:Choice>
@@ -6141,7 +6125,7 @@
           <a:graphicData uri="http://schemas.openxmlformats.org/presentationml/2006/ole">
             <mc:AlternateContent xmlns:mc="http://schemas.openxmlformats.org/markup-compatibility/2006">
               <mc:Choice xmlns:v="urn:schemas-microsoft-com:vml" Requires="v">
-                <p:oleObj spid="_x0000_s301157" name="Equation" r:id="rId4" imgW="1739900" imgH="1600200" progId="Equation.DSMT4">
+                <p:oleObj spid="_x0000_s301162" name="Equation" r:id="rId4" imgW="1739900" imgH="1600200" progId="Equation.DSMT4">
                   <p:embed/>
                 </p:oleObj>
               </mc:Choice>
@@ -6209,7 +6193,7 @@
           <a:graphicData uri="http://schemas.openxmlformats.org/presentationml/2006/ole">
             <mc:AlternateContent xmlns:mc="http://schemas.openxmlformats.org/markup-compatibility/2006">
               <mc:Choice xmlns:v="urn:schemas-microsoft-com:vml" Requires="v">
-                <p:oleObj spid="_x0000_s301158" name="Equation" r:id="rId6" imgW="1346200" imgH="1600200" progId="Equation.DSMT4">
+                <p:oleObj spid="_x0000_s301163" name="Equation" r:id="rId6" imgW="1346200" imgH="1600200" progId="Equation.DSMT4">
                   <p:embed/>
                 </p:oleObj>
               </mc:Choice>
@@ -6277,7 +6261,7 @@
           <a:graphicData uri="http://schemas.openxmlformats.org/presentationml/2006/ole">
             <mc:AlternateContent xmlns:mc="http://schemas.openxmlformats.org/markup-compatibility/2006">
               <mc:Choice xmlns:v="urn:schemas-microsoft-com:vml" Requires="v">
-                <p:oleObj spid="_x0000_s301159" name="Equation" r:id="rId8" imgW="6807200" imgH="2082800" progId="Equation.DSMT4">
+                <p:oleObj spid="_x0000_s301164" name="Equation" r:id="rId8" imgW="6807200" imgH="2082800" progId="Equation.DSMT4">
                   <p:embed/>
                 </p:oleObj>
               </mc:Choice>
@@ -6347,7 +6331,7 @@
           <a:graphicData uri="http://schemas.openxmlformats.org/presentationml/2006/ole">
             <mc:AlternateContent xmlns:mc="http://schemas.openxmlformats.org/markup-compatibility/2006">
               <mc:Choice xmlns:v="urn:schemas-microsoft-com:vml" Requires="v">
-                <p:oleObj spid="_x0000_s301160" name="Equation" r:id="rId10" imgW="2463800" imgH="965200" progId="Equation.DSMT4">
+                <p:oleObj spid="_x0000_s301165" name="Equation" r:id="rId10" imgW="2463800" imgH="965200" progId="Equation.DSMT4">
                   <p:embed/>
                 </p:oleObj>
               </mc:Choice>
@@ -6402,6 +6386,9 @@
                     <p:cTn id="3" fill="hold">
                       <p:stCondLst>
                         <p:cond delay="indefinite"/>
+                        <p:cond evt="onBegin" delay="0">
+                          <p:tn val="2"/>
+                        </p:cond>
                       </p:stCondLst>
                       <p:childTnLst>
                         <p:par>
@@ -6411,7 +6398,7 @@
                             </p:stCondLst>
                             <p:childTnLst>
                               <p:par>
-                                <p:cTn id="5" presetID="2" presetClass="entr" presetSubtype="4" fill="hold" nodeType="clickEffect">
+                                <p:cTn id="5" presetID="2" presetClass="entr" presetSubtype="4" fill="hold" nodeType="afterEffect">
                                   <p:stCondLst>
                                     <p:cond delay="0"/>
                                   </p:stCondLst>
@@ -6822,7 +6809,7 @@
           <a:graphicData uri="http://schemas.openxmlformats.org/presentationml/2006/ole">
             <mc:AlternateContent xmlns:mc="http://schemas.openxmlformats.org/markup-compatibility/2006">
               <mc:Choice xmlns:v="urn:schemas-microsoft-com:vml" Requires="v">
-                <p:oleObj spid="_x0000_s323589" name="Equation" r:id="rId4" imgW="1803400" imgH="1612900" progId="Equation.DSMT4">
+                <p:oleObj spid="_x0000_s323594" name="Equation" r:id="rId4" imgW="1803400" imgH="1612900" progId="Equation.DSMT4">
                   <p:embed/>
                 </p:oleObj>
               </mc:Choice>
@@ -6884,7 +6871,7 @@
           <a:graphicData uri="http://schemas.openxmlformats.org/presentationml/2006/ole">
             <mc:AlternateContent xmlns:mc="http://schemas.openxmlformats.org/markup-compatibility/2006">
               <mc:Choice xmlns:v="urn:schemas-microsoft-com:vml" Requires="v">
-                <p:oleObj spid="_x0000_s323590" name="Equation" r:id="rId6" imgW="1346200" imgH="1600200" progId="Equation.DSMT4">
+                <p:oleObj spid="_x0000_s323595" name="Equation" r:id="rId6" imgW="1346200" imgH="1600200" progId="Equation.DSMT4">
                   <p:embed/>
                 </p:oleObj>
               </mc:Choice>
@@ -6952,7 +6939,7 @@
           <a:graphicData uri="http://schemas.openxmlformats.org/presentationml/2006/ole">
             <mc:AlternateContent xmlns:mc="http://schemas.openxmlformats.org/markup-compatibility/2006">
               <mc:Choice xmlns:v="urn:schemas-microsoft-com:vml" Requires="v">
-                <p:oleObj spid="_x0000_s323591" name="Equation" r:id="rId8" imgW="6807200" imgH="2082800" progId="Equation.DSMT4">
+                <p:oleObj spid="_x0000_s323596" name="Equation" r:id="rId8" imgW="6807200" imgH="2082800" progId="Equation.DSMT4">
                   <p:embed/>
                 </p:oleObj>
               </mc:Choice>
@@ -7022,7 +7009,7 @@
           <a:graphicData uri="http://schemas.openxmlformats.org/presentationml/2006/ole">
             <mc:AlternateContent xmlns:mc="http://schemas.openxmlformats.org/markup-compatibility/2006">
               <mc:Choice xmlns:v="urn:schemas-microsoft-com:vml" Requires="v">
-                <p:oleObj spid="_x0000_s323592" name="Equation" r:id="rId10" imgW="2463800" imgH="965200" progId="Equation.DSMT4">
+                <p:oleObj spid="_x0000_s323597" name="Equation" r:id="rId10" imgW="2463800" imgH="965200" progId="Equation.DSMT4">
                   <p:embed/>
                 </p:oleObj>
               </mc:Choice>
@@ -7259,7 +7246,7 @@
           <a:graphicData uri="http://schemas.openxmlformats.org/presentationml/2006/ole">
             <mc:AlternateContent xmlns:mc="http://schemas.openxmlformats.org/markup-compatibility/2006">
               <mc:Choice xmlns:v="urn:schemas-microsoft-com:vml" Requires="v">
-                <p:oleObj spid="_x0000_s70728" name="Equation" r:id="rId4" imgW="5613400" imgH="2082800" progId="Equation.DSMT4">
+                <p:oleObj spid="_x0000_s70731" name="Equation" r:id="rId4" imgW="5613400" imgH="2082800" progId="Equation.DSMT4">
                   <p:embed/>
                 </p:oleObj>
               </mc:Choice>
@@ -7323,11 +7310,7 @@
           <a:p>
             <a:r>
               <a:rPr lang="en-US" sz="4800" dirty="0" smtClean="0"/>
-              <a:t>rabbit population </a:t>
-            </a:r>
-            <a:r>
-              <a:rPr lang="en-US" sz="4800" dirty="0" smtClean="0"/>
-              <a:t>grows </a:t>
+              <a:t>rabbit population grows </a:t>
             </a:r>
             <a:r>
               <a:rPr lang="en-US" sz="4800" dirty="0" smtClean="0">
@@ -7367,7 +7350,7 @@
           <a:graphicData uri="http://schemas.openxmlformats.org/presentationml/2006/ole">
             <mc:AlternateContent xmlns:mc="http://schemas.openxmlformats.org/markup-compatibility/2006">
               <mc:Choice xmlns:v="urn:schemas-microsoft-com:vml" Requires="v">
-                <p:oleObj spid="_x0000_s70729" name="Equation" r:id="rId6" imgW="3136680" imgH="1066680" progId="Equation.DSMT4">
+                <p:oleObj spid="_x0000_s70732" name="Equation" r:id="rId6" imgW="3136680" imgH="1066680" progId="Equation.DSMT4">
                   <p:embed/>
                 </p:oleObj>
               </mc:Choice>
@@ -7780,7 +7763,7 @@
           <a:graphicData uri="http://schemas.openxmlformats.org/presentationml/2006/ole">
             <mc:AlternateContent xmlns:mc="http://schemas.openxmlformats.org/markup-compatibility/2006">
               <mc:Choice xmlns:v="urn:schemas-microsoft-com:vml" Requires="v">
-                <p:oleObj spid="_x0000_s303147" name="Equation" r:id="rId4" imgW="6121400" imgH="2654300" progId="Equation.DSMT4">
+                <p:oleObj spid="_x0000_s303149" name="Equation" r:id="rId4" imgW="6121400" imgH="2654300" progId="Equation.DSMT4">
                   <p:embed/>
                 </p:oleObj>
               </mc:Choice>
@@ -7974,13 +7957,13 @@
   <p:clrMapOvr>
     <a:masterClrMapping/>
   </p:clrMapOvr>
-  <mc:AlternateContent xmlns:mc="http://schemas.openxmlformats.org/markup-compatibility/2006">
-    <mc:Choice xmlns:p14="http://schemas.microsoft.com/office/powerpoint/2010/main" Requires="p14">
+  <mc:AlternateContent xmlns:mc="http://schemas.openxmlformats.org/markup-compatibility/2006" xmlns:p14="http://schemas.microsoft.com/office/powerpoint/2010/main">
+    <mc:Choice Requires="p14">
       <p:transition spd="slow" p14:dur="1200" advClick="0">
         <p:fade/>
       </p:transition>
     </mc:Choice>
-    <mc:Fallback>
+    <mc:Fallback xmlns="">
       <p:transition xmlns:p14="http://schemas.microsoft.com/office/powerpoint/2010/main" spd="slow" advClick="0">
         <p:fade/>
       </p:transition>
@@ -8345,7 +8328,7 @@
           <a:graphicData uri="http://schemas.openxmlformats.org/presentationml/2006/ole">
             <mc:AlternateContent xmlns:mc="http://schemas.openxmlformats.org/markup-compatibility/2006">
               <mc:Choice xmlns:v="urn:schemas-microsoft-com:vml" Requires="v">
-                <p:oleObj spid="_x0000_s309253" name="Equation" r:id="rId4" imgW="3987720" imgH="1384200" progId="Equation.DSMT4">
+                <p:oleObj spid="_x0000_s309255" name="Equation" r:id="rId4" imgW="3987720" imgH="1384200" progId="Equation.DSMT4">
                   <p:embed/>
                 </p:oleObj>
               </mc:Choice>
@@ -8461,7 +8444,7 @@
           <a:graphicData uri="http://schemas.openxmlformats.org/presentationml/2006/ole">
             <mc:AlternateContent xmlns:mc="http://schemas.openxmlformats.org/markup-compatibility/2006">
               <mc:Choice xmlns:v="urn:schemas-microsoft-com:vml" Requires="v">
-                <p:oleObj spid="_x0000_s1038" name="Equation" r:id="rId4" imgW="1130300" imgH="508000" progId="Equation.DSMT4">
+                <p:oleObj spid="_x0000_s1042" name="Equation" r:id="rId4" imgW="1130300" imgH="508000" progId="Equation.DSMT4">
                   <p:embed/>
                 </p:oleObj>
               </mc:Choice>
@@ -8531,7 +8514,7 @@
           <a:graphicData uri="http://schemas.openxmlformats.org/presentationml/2006/ole">
             <mc:AlternateContent xmlns:mc="http://schemas.openxmlformats.org/markup-compatibility/2006">
               <mc:Choice xmlns:v="urn:schemas-microsoft-com:vml" Requires="v">
-                <p:oleObj spid="_x0000_s1039" name="Equation" r:id="rId6" imgW="1168400" imgH="495300" progId="Equation.DSMT4">
+                <p:oleObj spid="_x0000_s1043" name="Equation" r:id="rId6" imgW="1168400" imgH="495300" progId="Equation.DSMT4">
                   <p:embed/>
                 </p:oleObj>
               </mc:Choice>
@@ -8659,7 +8642,7 @@
           <a:graphicData uri="http://schemas.openxmlformats.org/presentationml/2006/ole">
             <mc:AlternateContent xmlns:mc="http://schemas.openxmlformats.org/markup-compatibility/2006">
               <mc:Choice xmlns:v="urn:schemas-microsoft-com:vml" Requires="v">
-                <p:oleObj spid="_x0000_s1040" name="Equation" r:id="rId8" imgW="2514600" imgH="520700" progId="Equation.DSMT4">
+                <p:oleObj spid="_x0000_s1044" name="Equation" r:id="rId8" imgW="2514600" imgH="520700" progId="Equation.DSMT4">
                   <p:embed/>
                 </p:oleObj>
               </mc:Choice>
@@ -9049,7 +9032,7 @@
           <a:graphicData uri="http://schemas.openxmlformats.org/presentationml/2006/ole">
             <mc:AlternateContent xmlns:mc="http://schemas.openxmlformats.org/markup-compatibility/2006">
               <mc:Choice xmlns:v="urn:schemas-microsoft-com:vml" Requires="v">
-                <p:oleObj spid="_x0000_s304142" name="Equation" r:id="rId4" imgW="3035300" imgH="342900" progId="Equation.3">
+                <p:oleObj spid="_x0000_s304146" name="Equation" r:id="rId4" imgW="3035300" imgH="342900" progId="Equation.3">
                   <p:embed/>
                 </p:oleObj>
               </mc:Choice>
@@ -9119,7 +9102,7 @@
           <a:graphicData uri="http://schemas.openxmlformats.org/presentationml/2006/ole">
             <mc:AlternateContent xmlns:mc="http://schemas.openxmlformats.org/markup-compatibility/2006">
               <mc:Choice xmlns:v="urn:schemas-microsoft-com:vml" Requires="v">
-                <p:oleObj spid="_x0000_s304143" name="Equation" r:id="rId6" imgW="2603500" imgH="342900" progId="Equation.3">
+                <p:oleObj spid="_x0000_s304147" name="Equation" r:id="rId6" imgW="2603500" imgH="342900" progId="Equation.3">
                   <p:embed/>
                 </p:oleObj>
               </mc:Choice>
@@ -9189,7 +9172,7 @@
           <a:graphicData uri="http://schemas.openxmlformats.org/presentationml/2006/ole">
             <mc:AlternateContent xmlns:mc="http://schemas.openxmlformats.org/markup-compatibility/2006">
               <mc:Choice xmlns:v="urn:schemas-microsoft-com:vml" Requires="v">
-                <p:oleObj spid="_x0000_s304144" name="Equation" r:id="rId8" imgW="2692400" imgH="342900" progId="Equation.DSMT4">
+                <p:oleObj spid="_x0000_s304148" name="Equation" r:id="rId8" imgW="2692400" imgH="342900" progId="Equation.DSMT4">
                   <p:embed/>
                 </p:oleObj>
               </mc:Choice>
@@ -9523,7 +9506,7 @@
           <a:graphicData uri="http://schemas.openxmlformats.org/presentationml/2006/ole">
             <mc:AlternateContent xmlns:mc="http://schemas.openxmlformats.org/markup-compatibility/2006">
               <mc:Choice xmlns:v="urn:schemas-microsoft-com:vml" Requires="v">
-                <p:oleObj spid="_x0000_s305166" name="Equation" r:id="rId4" imgW="2908300" imgH="342900" progId="Equation.3">
+                <p:oleObj spid="_x0000_s305170" name="Equation" r:id="rId4" imgW="2908300" imgH="342900" progId="Equation.3">
                   <p:embed/>
                 </p:oleObj>
               </mc:Choice>
@@ -9593,7 +9576,7 @@
           <a:graphicData uri="http://schemas.openxmlformats.org/presentationml/2006/ole">
             <mc:AlternateContent xmlns:mc="http://schemas.openxmlformats.org/markup-compatibility/2006">
               <mc:Choice xmlns:v="urn:schemas-microsoft-com:vml" Requires="v">
-                <p:oleObj spid="_x0000_s305167" name="Equation" r:id="rId6" imgW="1727200" imgH="342900" progId="Equation.3">
+                <p:oleObj spid="_x0000_s305171" name="Equation" r:id="rId6" imgW="1727200" imgH="342900" progId="Equation.3">
                   <p:embed/>
                 </p:oleObj>
               </mc:Choice>
@@ -9663,7 +9646,7 @@
           <a:graphicData uri="http://schemas.openxmlformats.org/presentationml/2006/ole">
             <mc:AlternateContent xmlns:mc="http://schemas.openxmlformats.org/markup-compatibility/2006">
               <mc:Choice xmlns:v="urn:schemas-microsoft-com:vml" Requires="v">
-                <p:oleObj spid="_x0000_s305168" name="Equation" r:id="rId8" imgW="1866900" imgH="304800" progId="Equation.DSMT4">
+                <p:oleObj spid="_x0000_s305172" name="Equation" r:id="rId8" imgW="1866900" imgH="304800" progId="Equation.DSMT4">
                   <p:embed/>
                 </p:oleObj>
               </mc:Choice>
@@ -9997,7 +9980,7 @@
           <a:graphicData uri="http://schemas.openxmlformats.org/presentationml/2006/ole">
             <mc:AlternateContent xmlns:mc="http://schemas.openxmlformats.org/markup-compatibility/2006">
               <mc:Choice xmlns:v="urn:schemas-microsoft-com:vml" Requires="v">
-                <p:oleObj spid="_x0000_s306190" name="Equation" r:id="rId4" imgW="2971800" imgH="342900" progId="Equation.3">
+                <p:oleObj spid="_x0000_s306194" name="Equation" r:id="rId4" imgW="2971800" imgH="342900" progId="Equation.3">
                   <p:embed/>
                 </p:oleObj>
               </mc:Choice>
@@ -10067,7 +10050,7 @@
           <a:graphicData uri="http://schemas.openxmlformats.org/presentationml/2006/ole">
             <mc:AlternateContent xmlns:mc="http://schemas.openxmlformats.org/markup-compatibility/2006">
               <mc:Choice xmlns:v="urn:schemas-microsoft-com:vml" Requires="v">
-                <p:oleObj spid="_x0000_s306191" name="Equation" r:id="rId6" imgW="3390900" imgH="342900" progId="Equation.3">
+                <p:oleObj spid="_x0000_s306195" name="Equation" r:id="rId6" imgW="3390900" imgH="342900" progId="Equation.3">
                   <p:embed/>
                 </p:oleObj>
               </mc:Choice>
@@ -10137,7 +10120,7 @@
           <a:graphicData uri="http://schemas.openxmlformats.org/presentationml/2006/ole">
             <mc:AlternateContent xmlns:mc="http://schemas.openxmlformats.org/markup-compatibility/2006">
               <mc:Choice xmlns:v="urn:schemas-microsoft-com:vml" Requires="v">
-                <p:oleObj spid="_x0000_s306192" name="Equation" r:id="rId8" imgW="2768600" imgH="495300" progId="Equation.DSMT4">
+                <p:oleObj spid="_x0000_s306196" name="Equation" r:id="rId8" imgW="2768600" imgH="495300" progId="Equation.DSMT4">
                   <p:embed/>
                 </p:oleObj>
               </mc:Choice>
@@ -10538,7 +10521,7 @@
           <a:graphicData uri="http://schemas.openxmlformats.org/presentationml/2006/ole">
             <mc:AlternateContent xmlns:mc="http://schemas.openxmlformats.org/markup-compatibility/2006">
               <mc:Choice xmlns:v="urn:schemas-microsoft-com:vml" Requires="v">
-                <p:oleObj spid="_x0000_s307230" name="Equation" r:id="rId4" imgW="6057900" imgH="762000" progId="Equation.DSMT4">
+                <p:oleObj spid="_x0000_s307238" name="Equation" r:id="rId4" imgW="6057900" imgH="762000" progId="Equation.DSMT4">
                   <p:embed/>
                 </p:oleObj>
               </mc:Choice>
@@ -10602,7 +10585,7 @@
           <a:graphicData uri="http://schemas.openxmlformats.org/presentationml/2006/ole">
             <mc:AlternateContent xmlns:mc="http://schemas.openxmlformats.org/markup-compatibility/2006">
               <mc:Choice xmlns:v="urn:schemas-microsoft-com:vml" Requires="v">
-                <p:oleObj spid="_x0000_s307231" name="Equation" r:id="rId6" imgW="1650960" imgH="520560" progId="Equation.DSMT4">
+                <p:oleObj spid="_x0000_s307239" name="Equation" r:id="rId6" imgW="1650960" imgH="520560" progId="Equation.DSMT4">
                   <p:embed/>
                 </p:oleObj>
               </mc:Choice>
@@ -10697,7 +10680,7 @@
           <a:graphicData uri="http://schemas.openxmlformats.org/presentationml/2006/ole">
             <mc:AlternateContent xmlns:mc="http://schemas.openxmlformats.org/markup-compatibility/2006">
               <mc:Choice xmlns:v="urn:schemas-microsoft-com:vml" Requires="v">
-                <p:oleObj spid="_x0000_s307232" name="Equation" r:id="rId8" imgW="1650960" imgH="520560" progId="Equation.DSMT4">
+                <p:oleObj spid="_x0000_s307240" name="Equation" r:id="rId8" imgW="1650960" imgH="520560" progId="Equation.DSMT4">
                   <p:embed/>
                 </p:oleObj>
               </mc:Choice>
@@ -10798,7 +10781,7 @@
           <a:graphicData uri="http://schemas.openxmlformats.org/presentationml/2006/ole">
             <mc:AlternateContent xmlns:mc="http://schemas.openxmlformats.org/markup-compatibility/2006">
               <mc:Choice xmlns:v="urn:schemas-microsoft-com:vml" Requires="v">
-                <p:oleObj spid="_x0000_s307233" name="Equation" r:id="rId10" imgW="6413500" imgH="762000" progId="Equation.DSMT4">
+                <p:oleObj spid="_x0000_s307241" name="Equation" r:id="rId10" imgW="6413500" imgH="762000" progId="Equation.DSMT4">
                   <p:embed/>
                 </p:oleObj>
               </mc:Choice>
@@ -10868,7 +10851,7 @@
           <a:graphicData uri="http://schemas.openxmlformats.org/presentationml/2006/ole">
             <mc:AlternateContent xmlns:mc="http://schemas.openxmlformats.org/markup-compatibility/2006">
               <mc:Choice xmlns:v="urn:schemas-microsoft-com:vml" Requires="v">
-                <p:oleObj spid="_x0000_s307234" name="Equation" r:id="rId12" imgW="7175500" imgH="1612900" progId="Equation.DSMT4">
+                <p:oleObj spid="_x0000_s307242" name="Equation" r:id="rId12" imgW="7175500" imgH="1612900" progId="Equation.DSMT4">
                   <p:embed/>
                 </p:oleObj>
               </mc:Choice>
@@ -10932,7 +10915,7 @@
           <a:graphicData uri="http://schemas.openxmlformats.org/presentationml/2006/ole">
             <mc:AlternateContent xmlns:mc="http://schemas.openxmlformats.org/markup-compatibility/2006">
               <mc:Choice xmlns:v="urn:schemas-microsoft-com:vml" Requires="v">
-                <p:oleObj spid="_x0000_s307235" name="Equation" r:id="rId14" imgW="3047760" imgH="1193760" progId="Equation.DSMT4">
+                <p:oleObj spid="_x0000_s307243" name="Equation" r:id="rId14" imgW="3047760" imgH="1193760" progId="Equation.DSMT4">
                   <p:embed/>
                 </p:oleObj>
               </mc:Choice>
@@ -11008,7 +10991,7 @@
           <a:graphicData uri="http://schemas.openxmlformats.org/presentationml/2006/ole">
             <mc:AlternateContent xmlns:mc="http://schemas.openxmlformats.org/markup-compatibility/2006">
               <mc:Choice xmlns:v="urn:schemas-microsoft-com:vml" Requires="v">
-                <p:oleObj spid="_x0000_s307236" name="Equation" r:id="rId16" imgW="1422400" imgH="1409700" progId="Equation.DSMT4">
+                <p:oleObj spid="_x0000_s307244" name="Equation" r:id="rId16" imgW="1422400" imgH="1409700" progId="Equation.DSMT4">
                   <p:embed/>
                 </p:oleObj>
               </mc:Choice>
@@ -11725,7 +11708,7 @@
           <a:graphicData uri="http://schemas.openxmlformats.org/presentationml/2006/ole">
             <mc:AlternateContent xmlns:mc="http://schemas.openxmlformats.org/markup-compatibility/2006">
               <mc:Choice xmlns:v="urn:schemas-microsoft-com:vml" Requires="v">
-                <p:oleObj spid="_x0000_s43081" name="Equation" r:id="rId4" imgW="3987720" imgH="1244520" progId="Equation.DSMT4">
+                <p:oleObj spid="_x0000_s43084" name="Equation" r:id="rId4" imgW="3987720" imgH="1244520" progId="Equation.DSMT4">
                   <p:embed/>
                 </p:oleObj>
               </mc:Choice>
@@ -11801,7 +11784,7 @@
           <a:graphicData uri="http://schemas.openxmlformats.org/presentationml/2006/ole">
             <mc:AlternateContent xmlns:mc="http://schemas.openxmlformats.org/markup-compatibility/2006">
               <mc:Choice xmlns:v="urn:schemas-microsoft-com:vml" Requires="v">
-                <p:oleObj spid="_x0000_s43082" name="Equation" r:id="rId6" imgW="6451600" imgH="787400" progId="Equation.DSMT4">
+                <p:oleObj spid="_x0000_s43085" name="Equation" r:id="rId6" imgW="6451600" imgH="787400" progId="Equation.DSMT4">
                   <p:embed/>
                 </p:oleObj>
               </mc:Choice>
@@ -12505,7 +12488,7 @@
           <a:graphicData uri="http://schemas.openxmlformats.org/presentationml/2006/ole">
             <mc:AlternateContent xmlns:mc="http://schemas.openxmlformats.org/markup-compatibility/2006">
               <mc:Choice xmlns:v="urn:schemas-microsoft-com:vml" Requires="v">
-                <p:oleObj spid="_x0000_s190565" name="Equation" r:id="rId4" imgW="3987720" imgH="1244520" progId="Equation.DSMT4">
+                <p:oleObj spid="_x0000_s190569" name="Equation" r:id="rId4" imgW="3987720" imgH="1244520" progId="Equation.DSMT4">
                   <p:embed/>
                 </p:oleObj>
               </mc:Choice>
@@ -12581,7 +12564,7 @@
           <a:graphicData uri="http://schemas.openxmlformats.org/presentationml/2006/ole">
             <mc:AlternateContent xmlns:mc="http://schemas.openxmlformats.org/markup-compatibility/2006">
               <mc:Choice xmlns:v="urn:schemas-microsoft-com:vml" Requires="v">
-                <p:oleObj spid="_x0000_s190566" name="Equation" r:id="rId6" imgW="6451600" imgH="787400" progId="Equation.DSMT4">
+                <p:oleObj spid="_x0000_s190570" name="Equation" r:id="rId6" imgW="6451600" imgH="787400" progId="Equation.DSMT4">
                   <p:embed/>
                 </p:oleObj>
               </mc:Choice>
@@ -12651,7 +12634,7 @@
           <a:graphicData uri="http://schemas.openxmlformats.org/presentationml/2006/ole">
             <mc:AlternateContent xmlns:mc="http://schemas.openxmlformats.org/markup-compatibility/2006">
               <mc:Choice xmlns:v="urn:schemas-microsoft-com:vml" Requires="v">
-                <p:oleObj spid="_x0000_s190567" name="Equation" r:id="rId8" imgW="5321300" imgH="1511300" progId="Equation.DSMT4">
+                <p:oleObj spid="_x0000_s190571" name="Equation" r:id="rId8" imgW="5321300" imgH="1511300" progId="Equation.DSMT4">
                   <p:embed/>
                 </p:oleObj>
               </mc:Choice>

</xml_diff>

<commit_message>
tweak & timing linrec-fibonacci genfunc-fibonacci
</commit_message>
<xml_diff>
--- a/spring13/slides13/genfunc-fibonacci.pptx
+++ b/spring13/slides13/genfunc-fibonacci.pptx
@@ -3680,15 +3680,7 @@
                   <a:schemeClr val="tx2"/>
                 </a:solidFill>
               </a:rPr>
-              <a:t>Closed Form </a:t>
-            </a:r>
-            <a:r>
-              <a:rPr lang="en-US" sz="5400" b="1" dirty="0" smtClean="0">
-                <a:solidFill>
-                  <a:schemeClr val="tx2"/>
-                </a:solidFill>
-              </a:rPr>
-              <a:t>for Fibonacci Recurrence</a:t>
+              <a:t>Closed Form for Fibonacci Recurrence</a:t>
             </a:r>
           </a:p>
         </p:txBody>
@@ -4061,7 +4053,7 @@
           <a:graphicData uri="http://schemas.openxmlformats.org/presentationml/2006/ole">
             <mc:AlternateContent xmlns:mc="http://schemas.openxmlformats.org/markup-compatibility/2006">
               <mc:Choice xmlns:v="urn:schemas-microsoft-com:vml" Requires="v">
-                <p:oleObj spid="_x0000_s66643" name="Equation" r:id="rId4" imgW="5664200" imgH="1066800" progId="Equation.DSMT4">
+                <p:oleObj spid="_x0000_s66646" name="Equation" r:id="rId4" imgW="5664200" imgH="1066800" progId="Equation.DSMT4">
                   <p:embed/>
                 </p:oleObj>
               </mc:Choice>
@@ -4138,7 +4130,7 @@
             <a:r>
               <a:rPr lang="en-US" sz="4800" dirty="0" smtClean="0">
                 <a:solidFill>
-                  <a:srgbClr val="FF6600"/>
+                  <a:srgbClr val="FF0000"/>
                 </a:solidFill>
               </a:rPr>
               <a:t>a</a:t>
@@ -4150,14 +4142,14 @@
             <a:r>
               <a:rPr lang="en-US" sz="4800" dirty="0" smtClean="0">
                 <a:solidFill>
-                  <a:srgbClr val="FF6600"/>
+                  <a:srgbClr val="FF0000"/>
                 </a:solidFill>
               </a:rPr>
               <a:t>b</a:t>
             </a:r>
             <a:endParaRPr lang="en-US" sz="4800" dirty="0">
               <a:solidFill>
-                <a:srgbClr val="FF6600"/>
+                <a:srgbClr val="FF0000"/>
               </a:solidFill>
             </a:endParaRPr>
           </a:p>
@@ -4185,7 +4177,7 @@
           <a:graphicData uri="http://schemas.openxmlformats.org/presentationml/2006/ole">
             <mc:AlternateContent xmlns:mc="http://schemas.openxmlformats.org/markup-compatibility/2006">
               <mc:Choice xmlns:v="urn:schemas-microsoft-com:vml" Requires="v">
-                <p:oleObj spid="_x0000_s66644" name="Equation" r:id="rId6" imgW="5219700" imgH="1663700" progId="Equation.DSMT4">
+                <p:oleObj spid="_x0000_s66647" name="Equation" r:id="rId6" imgW="5219700" imgH="1663700" progId="Equation.DSMT4">
                   <p:embed/>
                 </p:oleObj>
               </mc:Choice>
@@ -4657,7 +4649,7 @@
           <a:graphicData uri="http://schemas.openxmlformats.org/presentationml/2006/ole">
             <mc:AlternateContent xmlns:mc="http://schemas.openxmlformats.org/markup-compatibility/2006">
               <mc:Choice xmlns:v="urn:schemas-microsoft-com:vml" Requires="v">
-                <p:oleObj spid="_x0000_s67688" name="Equation" r:id="rId4" imgW="7175500" imgH="1587500" progId="Equation.DSMT4">
+                <p:oleObj spid="_x0000_s67692" name="Equation" r:id="rId4" imgW="7175500" imgH="1587500" progId="Equation.DSMT4">
                   <p:embed/>
                 </p:oleObj>
               </mc:Choice>
@@ -4727,7 +4719,7 @@
           <a:graphicData uri="http://schemas.openxmlformats.org/presentationml/2006/ole">
             <mc:AlternateContent xmlns:mc="http://schemas.openxmlformats.org/markup-compatibility/2006">
               <mc:Choice xmlns:v="urn:schemas-microsoft-com:vml" Requires="v">
-                <p:oleObj spid="_x0000_s67689" name="Equation" r:id="rId6" imgW="5829300" imgH="863600" progId="Equation.DSMT4">
+                <p:oleObj spid="_x0000_s67693" name="Equation" r:id="rId6" imgW="5829300" imgH="863600" progId="Equation.DSMT4">
                   <p:embed/>
                 </p:oleObj>
               </mc:Choice>
@@ -4812,7 +4804,7 @@
             <a:r>
               <a:rPr lang="en-US" sz="4000" dirty="0" smtClean="0">
                 <a:solidFill>
-                  <a:srgbClr val="FF6600"/>
+                  <a:srgbClr val="FF0000"/>
                 </a:solidFill>
               </a:rPr>
               <a:t>a</a:t>
@@ -4824,7 +4816,7 @@
             <a:r>
               <a:rPr lang="en-US" sz="4000" dirty="0" err="1" smtClean="0">
                 <a:solidFill>
-                  <a:srgbClr val="FF6600"/>
+                  <a:srgbClr val="FF0000"/>
                 </a:solidFill>
               </a:rPr>
               <a:t>b</a:t>
@@ -4915,7 +4907,7 @@
             <a:graphicData uri="http://schemas.openxmlformats.org/presentationml/2006/ole">
               <mc:AlternateContent xmlns:mc="http://schemas.openxmlformats.org/markup-compatibility/2006">
                 <mc:Choice xmlns:v="urn:schemas-microsoft-com:vml" Requires="v">
-                  <p:oleObj spid="_x0000_s67690" name="Equation" r:id="rId8" imgW="2768600" imgH="571500" progId="Equation.DSMT4">
+                  <p:oleObj spid="_x0000_s67694" name="Equation" r:id="rId8" imgW="2768600" imgH="571500" progId="Equation.DSMT4">
                     <p:embed/>
                   </p:oleObj>
                 </mc:Choice>
@@ -5513,7 +5505,7 @@
           <a:graphicData uri="http://schemas.openxmlformats.org/presentationml/2006/ole">
             <mc:AlternateContent xmlns:mc="http://schemas.openxmlformats.org/markup-compatibility/2006">
               <mc:Choice xmlns:v="urn:schemas-microsoft-com:vml" Requires="v">
-                <p:oleObj spid="_x0000_s109621" name="Equation" r:id="rId4" imgW="6807200" imgH="2082800" progId="Equation.DSMT4">
+                <p:oleObj spid="_x0000_s109624" name="Equation" r:id="rId4" imgW="6807200" imgH="2082800" progId="Equation.DSMT4">
                   <p:embed/>
                 </p:oleObj>
               </mc:Choice>
@@ -5583,7 +5575,7 @@
           <a:graphicData uri="http://schemas.openxmlformats.org/presentationml/2006/ole">
             <mc:AlternateContent xmlns:mc="http://schemas.openxmlformats.org/markup-compatibility/2006">
               <mc:Choice xmlns:v="urn:schemas-microsoft-com:vml" Requires="v">
-                <p:oleObj spid="_x0000_s109622" name="Equation" r:id="rId6" imgW="2463800" imgH="965200" progId="Equation.DSMT4">
+                <p:oleObj spid="_x0000_s109625" name="Equation" r:id="rId6" imgW="2463800" imgH="965200" progId="Equation.DSMT4">
                   <p:embed/>
                 </p:oleObj>
               </mc:Choice>
@@ -6125,7 +6117,7 @@
           <a:graphicData uri="http://schemas.openxmlformats.org/presentationml/2006/ole">
             <mc:AlternateContent xmlns:mc="http://schemas.openxmlformats.org/markup-compatibility/2006">
               <mc:Choice xmlns:v="urn:schemas-microsoft-com:vml" Requires="v">
-                <p:oleObj spid="_x0000_s301162" name="Equation" r:id="rId4" imgW="1739900" imgH="1600200" progId="Equation.DSMT4">
+                <p:oleObj spid="_x0000_s301167" name="Equation" r:id="rId4" imgW="1739900" imgH="1600200" progId="Equation.DSMT4">
                   <p:embed/>
                 </p:oleObj>
               </mc:Choice>
@@ -6193,7 +6185,7 @@
           <a:graphicData uri="http://schemas.openxmlformats.org/presentationml/2006/ole">
             <mc:AlternateContent xmlns:mc="http://schemas.openxmlformats.org/markup-compatibility/2006">
               <mc:Choice xmlns:v="urn:schemas-microsoft-com:vml" Requires="v">
-                <p:oleObj spid="_x0000_s301163" name="Equation" r:id="rId6" imgW="1346200" imgH="1600200" progId="Equation.DSMT4">
+                <p:oleObj spid="_x0000_s301168" name="Equation" r:id="rId6" imgW="1346200" imgH="1600200" progId="Equation.DSMT4">
                   <p:embed/>
                 </p:oleObj>
               </mc:Choice>
@@ -6261,7 +6253,7 @@
           <a:graphicData uri="http://schemas.openxmlformats.org/presentationml/2006/ole">
             <mc:AlternateContent xmlns:mc="http://schemas.openxmlformats.org/markup-compatibility/2006">
               <mc:Choice xmlns:v="urn:schemas-microsoft-com:vml" Requires="v">
-                <p:oleObj spid="_x0000_s301164" name="Equation" r:id="rId8" imgW="6807200" imgH="2082800" progId="Equation.DSMT4">
+                <p:oleObj spid="_x0000_s301169" name="Equation" r:id="rId8" imgW="6807200" imgH="2082800" progId="Equation.DSMT4">
                   <p:embed/>
                 </p:oleObj>
               </mc:Choice>
@@ -6331,7 +6323,7 @@
           <a:graphicData uri="http://schemas.openxmlformats.org/presentationml/2006/ole">
             <mc:AlternateContent xmlns:mc="http://schemas.openxmlformats.org/markup-compatibility/2006">
               <mc:Choice xmlns:v="urn:schemas-microsoft-com:vml" Requires="v">
-                <p:oleObj spid="_x0000_s301165" name="Equation" r:id="rId10" imgW="2463800" imgH="965200" progId="Equation.DSMT4">
+                <p:oleObj spid="_x0000_s301170" name="Equation" r:id="rId10" imgW="2463800" imgH="965200" progId="Equation.DSMT4">
                   <p:embed/>
                 </p:oleObj>
               </mc:Choice>
@@ -6398,7 +6390,7 @@
                             </p:stCondLst>
                             <p:childTnLst>
                               <p:par>
-                                <p:cTn id="5" presetID="2" presetClass="entr" presetSubtype="4" fill="hold" nodeType="afterEffect">
+                                <p:cTn id="5" presetID="2" presetClass="entr" presetSubtype="4" fill="hold" nodeType="withEffect">
                                   <p:stCondLst>
                                     <p:cond delay="0"/>
                                   </p:stCondLst>
@@ -6809,7 +6801,7 @@
           <a:graphicData uri="http://schemas.openxmlformats.org/presentationml/2006/ole">
             <mc:AlternateContent xmlns:mc="http://schemas.openxmlformats.org/markup-compatibility/2006">
               <mc:Choice xmlns:v="urn:schemas-microsoft-com:vml" Requires="v">
-                <p:oleObj spid="_x0000_s323594" name="Equation" r:id="rId4" imgW="1803400" imgH="1612900" progId="Equation.DSMT4">
+                <p:oleObj spid="_x0000_s323599" name="Equation" r:id="rId4" imgW="1803400" imgH="1612900" progId="Equation.DSMT4">
                   <p:embed/>
                 </p:oleObj>
               </mc:Choice>
@@ -6871,7 +6863,7 @@
           <a:graphicData uri="http://schemas.openxmlformats.org/presentationml/2006/ole">
             <mc:AlternateContent xmlns:mc="http://schemas.openxmlformats.org/markup-compatibility/2006">
               <mc:Choice xmlns:v="urn:schemas-microsoft-com:vml" Requires="v">
-                <p:oleObj spid="_x0000_s323595" name="Equation" r:id="rId6" imgW="1346200" imgH="1600200" progId="Equation.DSMT4">
+                <p:oleObj spid="_x0000_s323600" name="Equation" r:id="rId6" imgW="1346200" imgH="1600200" progId="Equation.DSMT4">
                   <p:embed/>
                 </p:oleObj>
               </mc:Choice>
@@ -6939,7 +6931,7 @@
           <a:graphicData uri="http://schemas.openxmlformats.org/presentationml/2006/ole">
             <mc:AlternateContent xmlns:mc="http://schemas.openxmlformats.org/markup-compatibility/2006">
               <mc:Choice xmlns:v="urn:schemas-microsoft-com:vml" Requires="v">
-                <p:oleObj spid="_x0000_s323596" name="Equation" r:id="rId8" imgW="6807200" imgH="2082800" progId="Equation.DSMT4">
+                <p:oleObj spid="_x0000_s323601" name="Equation" r:id="rId8" imgW="6807200" imgH="2082800" progId="Equation.DSMT4">
                   <p:embed/>
                 </p:oleObj>
               </mc:Choice>
@@ -7009,7 +7001,7 @@
           <a:graphicData uri="http://schemas.openxmlformats.org/presentationml/2006/ole">
             <mc:AlternateContent xmlns:mc="http://schemas.openxmlformats.org/markup-compatibility/2006">
               <mc:Choice xmlns:v="urn:schemas-microsoft-com:vml" Requires="v">
-                <p:oleObj spid="_x0000_s323597" name="Equation" r:id="rId10" imgW="2463800" imgH="965200" progId="Equation.DSMT4">
+                <p:oleObj spid="_x0000_s323602" name="Equation" r:id="rId10" imgW="2463800" imgH="965200" progId="Equation.DSMT4">
                   <p:embed/>
                 </p:oleObj>
               </mc:Choice>
@@ -7246,7 +7238,7 @@
           <a:graphicData uri="http://schemas.openxmlformats.org/presentationml/2006/ole">
             <mc:AlternateContent xmlns:mc="http://schemas.openxmlformats.org/markup-compatibility/2006">
               <mc:Choice xmlns:v="urn:schemas-microsoft-com:vml" Requires="v">
-                <p:oleObj spid="_x0000_s70731" name="Equation" r:id="rId4" imgW="5613400" imgH="2082800" progId="Equation.DSMT4">
+                <p:oleObj spid="_x0000_s70734" name="Equation" r:id="rId4" imgW="5613400" imgH="2082800" progId="Equation.DSMT4">
                   <p:embed/>
                 </p:oleObj>
               </mc:Choice>
@@ -7350,7 +7342,7 @@
           <a:graphicData uri="http://schemas.openxmlformats.org/presentationml/2006/ole">
             <mc:AlternateContent xmlns:mc="http://schemas.openxmlformats.org/markup-compatibility/2006">
               <mc:Choice xmlns:v="urn:schemas-microsoft-com:vml" Requires="v">
-                <p:oleObj spid="_x0000_s70732" name="Equation" r:id="rId6" imgW="3136680" imgH="1066680" progId="Equation.DSMT4">
+                <p:oleObj spid="_x0000_s70735" name="Equation" r:id="rId6" imgW="3136680" imgH="1066680" progId="Equation.DSMT4">
                   <p:embed/>
                 </p:oleObj>
               </mc:Choice>
@@ -7763,7 +7755,7 @@
           <a:graphicData uri="http://schemas.openxmlformats.org/presentationml/2006/ole">
             <mc:AlternateContent xmlns:mc="http://schemas.openxmlformats.org/markup-compatibility/2006">
               <mc:Choice xmlns:v="urn:schemas-microsoft-com:vml" Requires="v">
-                <p:oleObj spid="_x0000_s303149" name="Equation" r:id="rId4" imgW="6121400" imgH="2654300" progId="Equation.DSMT4">
+                <p:oleObj spid="_x0000_s303151" name="Equation" r:id="rId4" imgW="6121400" imgH="2654300" progId="Equation.DSMT4">
                   <p:embed/>
                 </p:oleObj>
               </mc:Choice>
@@ -8328,7 +8320,7 @@
           <a:graphicData uri="http://schemas.openxmlformats.org/presentationml/2006/ole">
             <mc:AlternateContent xmlns:mc="http://schemas.openxmlformats.org/markup-compatibility/2006">
               <mc:Choice xmlns:v="urn:schemas-microsoft-com:vml" Requires="v">
-                <p:oleObj spid="_x0000_s309255" name="Equation" r:id="rId4" imgW="3987720" imgH="1384200" progId="Equation.DSMT4">
+                <p:oleObj spid="_x0000_s309257" name="Equation" r:id="rId4" imgW="3987720" imgH="1384200" progId="Equation.DSMT4">
                   <p:embed/>
                 </p:oleObj>
               </mc:Choice>
@@ -8444,7 +8436,7 @@
           <a:graphicData uri="http://schemas.openxmlformats.org/presentationml/2006/ole">
             <mc:AlternateContent xmlns:mc="http://schemas.openxmlformats.org/markup-compatibility/2006">
               <mc:Choice xmlns:v="urn:schemas-microsoft-com:vml" Requires="v">
-                <p:oleObj spid="_x0000_s1042" name="Equation" r:id="rId4" imgW="1130300" imgH="508000" progId="Equation.DSMT4">
+                <p:oleObj spid="_x0000_s1046" name="Equation" r:id="rId4" imgW="1130300" imgH="508000" progId="Equation.DSMT4">
                   <p:embed/>
                 </p:oleObj>
               </mc:Choice>
@@ -8514,7 +8506,7 @@
           <a:graphicData uri="http://schemas.openxmlformats.org/presentationml/2006/ole">
             <mc:AlternateContent xmlns:mc="http://schemas.openxmlformats.org/markup-compatibility/2006">
               <mc:Choice xmlns:v="urn:schemas-microsoft-com:vml" Requires="v">
-                <p:oleObj spid="_x0000_s1043" name="Equation" r:id="rId6" imgW="1168400" imgH="495300" progId="Equation.DSMT4">
+                <p:oleObj spid="_x0000_s1047" name="Equation" r:id="rId6" imgW="1168400" imgH="495300" progId="Equation.DSMT4">
                   <p:embed/>
                 </p:oleObj>
               </mc:Choice>
@@ -8642,7 +8634,7 @@
           <a:graphicData uri="http://schemas.openxmlformats.org/presentationml/2006/ole">
             <mc:AlternateContent xmlns:mc="http://schemas.openxmlformats.org/markup-compatibility/2006">
               <mc:Choice xmlns:v="urn:schemas-microsoft-com:vml" Requires="v">
-                <p:oleObj spid="_x0000_s1044" name="Equation" r:id="rId8" imgW="2514600" imgH="520700" progId="Equation.DSMT4">
+                <p:oleObj spid="_x0000_s1048" name="Equation" r:id="rId8" imgW="2514600" imgH="520700" progId="Equation.DSMT4">
                   <p:embed/>
                 </p:oleObj>
               </mc:Choice>
@@ -9032,7 +9024,7 @@
           <a:graphicData uri="http://schemas.openxmlformats.org/presentationml/2006/ole">
             <mc:AlternateContent xmlns:mc="http://schemas.openxmlformats.org/markup-compatibility/2006">
               <mc:Choice xmlns:v="urn:schemas-microsoft-com:vml" Requires="v">
-                <p:oleObj spid="_x0000_s304146" name="Equation" r:id="rId4" imgW="3035300" imgH="342900" progId="Equation.3">
+                <p:oleObj spid="_x0000_s304150" name="Equation" r:id="rId4" imgW="3035300" imgH="342900" progId="Equation.3">
                   <p:embed/>
                 </p:oleObj>
               </mc:Choice>
@@ -9102,7 +9094,7 @@
           <a:graphicData uri="http://schemas.openxmlformats.org/presentationml/2006/ole">
             <mc:AlternateContent xmlns:mc="http://schemas.openxmlformats.org/markup-compatibility/2006">
               <mc:Choice xmlns:v="urn:schemas-microsoft-com:vml" Requires="v">
-                <p:oleObj spid="_x0000_s304147" name="Equation" r:id="rId6" imgW="2603500" imgH="342900" progId="Equation.3">
+                <p:oleObj spid="_x0000_s304151" name="Equation" r:id="rId6" imgW="2603500" imgH="342900" progId="Equation.3">
                   <p:embed/>
                 </p:oleObj>
               </mc:Choice>
@@ -9172,7 +9164,7 @@
           <a:graphicData uri="http://schemas.openxmlformats.org/presentationml/2006/ole">
             <mc:AlternateContent xmlns:mc="http://schemas.openxmlformats.org/markup-compatibility/2006">
               <mc:Choice xmlns:v="urn:schemas-microsoft-com:vml" Requires="v">
-                <p:oleObj spid="_x0000_s304148" name="Equation" r:id="rId8" imgW="2692400" imgH="342900" progId="Equation.DSMT4">
+                <p:oleObj spid="_x0000_s304152" name="Equation" r:id="rId8" imgW="2692400" imgH="342900" progId="Equation.DSMT4">
                   <p:embed/>
                 </p:oleObj>
               </mc:Choice>
@@ -9506,7 +9498,7 @@
           <a:graphicData uri="http://schemas.openxmlformats.org/presentationml/2006/ole">
             <mc:AlternateContent xmlns:mc="http://schemas.openxmlformats.org/markup-compatibility/2006">
               <mc:Choice xmlns:v="urn:schemas-microsoft-com:vml" Requires="v">
-                <p:oleObj spid="_x0000_s305170" name="Equation" r:id="rId4" imgW="2908300" imgH="342900" progId="Equation.3">
+                <p:oleObj spid="_x0000_s305174" name="Equation" r:id="rId4" imgW="2908300" imgH="342900" progId="Equation.3">
                   <p:embed/>
                 </p:oleObj>
               </mc:Choice>
@@ -9576,7 +9568,7 @@
           <a:graphicData uri="http://schemas.openxmlformats.org/presentationml/2006/ole">
             <mc:AlternateContent xmlns:mc="http://schemas.openxmlformats.org/markup-compatibility/2006">
               <mc:Choice xmlns:v="urn:schemas-microsoft-com:vml" Requires="v">
-                <p:oleObj spid="_x0000_s305171" name="Equation" r:id="rId6" imgW="1727200" imgH="342900" progId="Equation.3">
+                <p:oleObj spid="_x0000_s305175" name="Equation" r:id="rId6" imgW="1727200" imgH="342900" progId="Equation.3">
                   <p:embed/>
                 </p:oleObj>
               </mc:Choice>
@@ -9646,7 +9638,7 @@
           <a:graphicData uri="http://schemas.openxmlformats.org/presentationml/2006/ole">
             <mc:AlternateContent xmlns:mc="http://schemas.openxmlformats.org/markup-compatibility/2006">
               <mc:Choice xmlns:v="urn:schemas-microsoft-com:vml" Requires="v">
-                <p:oleObj spid="_x0000_s305172" name="Equation" r:id="rId8" imgW="1866900" imgH="304800" progId="Equation.DSMT4">
+                <p:oleObj spid="_x0000_s305176" name="Equation" r:id="rId8" imgW="1866900" imgH="304800" progId="Equation.DSMT4">
                   <p:embed/>
                 </p:oleObj>
               </mc:Choice>
@@ -9980,7 +9972,7 @@
           <a:graphicData uri="http://schemas.openxmlformats.org/presentationml/2006/ole">
             <mc:AlternateContent xmlns:mc="http://schemas.openxmlformats.org/markup-compatibility/2006">
               <mc:Choice xmlns:v="urn:schemas-microsoft-com:vml" Requires="v">
-                <p:oleObj spid="_x0000_s306194" name="Equation" r:id="rId4" imgW="2971800" imgH="342900" progId="Equation.3">
+                <p:oleObj spid="_x0000_s306198" name="Equation" r:id="rId4" imgW="2971800" imgH="342900" progId="Equation.3">
                   <p:embed/>
                 </p:oleObj>
               </mc:Choice>
@@ -10050,7 +10042,7 @@
           <a:graphicData uri="http://schemas.openxmlformats.org/presentationml/2006/ole">
             <mc:AlternateContent xmlns:mc="http://schemas.openxmlformats.org/markup-compatibility/2006">
               <mc:Choice xmlns:v="urn:schemas-microsoft-com:vml" Requires="v">
-                <p:oleObj spid="_x0000_s306195" name="Equation" r:id="rId6" imgW="3390900" imgH="342900" progId="Equation.3">
+                <p:oleObj spid="_x0000_s306199" name="Equation" r:id="rId6" imgW="3390900" imgH="342900" progId="Equation.3">
                   <p:embed/>
                 </p:oleObj>
               </mc:Choice>
@@ -10120,7 +10112,7 @@
           <a:graphicData uri="http://schemas.openxmlformats.org/presentationml/2006/ole">
             <mc:AlternateContent xmlns:mc="http://schemas.openxmlformats.org/markup-compatibility/2006">
               <mc:Choice xmlns:v="urn:schemas-microsoft-com:vml" Requires="v">
-                <p:oleObj spid="_x0000_s306196" name="Equation" r:id="rId8" imgW="2768600" imgH="495300" progId="Equation.DSMT4">
+                <p:oleObj spid="_x0000_s306200" name="Equation" r:id="rId8" imgW="2768600" imgH="495300" progId="Equation.DSMT4">
                   <p:embed/>
                 </p:oleObj>
               </mc:Choice>
@@ -10521,7 +10513,7 @@
           <a:graphicData uri="http://schemas.openxmlformats.org/presentationml/2006/ole">
             <mc:AlternateContent xmlns:mc="http://schemas.openxmlformats.org/markup-compatibility/2006">
               <mc:Choice xmlns:v="urn:schemas-microsoft-com:vml" Requires="v">
-                <p:oleObj spid="_x0000_s307238" name="Equation" r:id="rId4" imgW="6057900" imgH="762000" progId="Equation.DSMT4">
+                <p:oleObj spid="_x0000_s307246" name="Equation" r:id="rId4" imgW="6057900" imgH="762000" progId="Equation.DSMT4">
                   <p:embed/>
                 </p:oleObj>
               </mc:Choice>
@@ -10585,7 +10577,7 @@
           <a:graphicData uri="http://schemas.openxmlformats.org/presentationml/2006/ole">
             <mc:AlternateContent xmlns:mc="http://schemas.openxmlformats.org/markup-compatibility/2006">
               <mc:Choice xmlns:v="urn:schemas-microsoft-com:vml" Requires="v">
-                <p:oleObj spid="_x0000_s307239" name="Equation" r:id="rId6" imgW="1650960" imgH="520560" progId="Equation.DSMT4">
+                <p:oleObj spid="_x0000_s307247" name="Equation" r:id="rId6" imgW="1650960" imgH="520560" progId="Equation.DSMT4">
                   <p:embed/>
                 </p:oleObj>
               </mc:Choice>
@@ -10680,7 +10672,7 @@
           <a:graphicData uri="http://schemas.openxmlformats.org/presentationml/2006/ole">
             <mc:AlternateContent xmlns:mc="http://schemas.openxmlformats.org/markup-compatibility/2006">
               <mc:Choice xmlns:v="urn:schemas-microsoft-com:vml" Requires="v">
-                <p:oleObj spid="_x0000_s307240" name="Equation" r:id="rId8" imgW="1650960" imgH="520560" progId="Equation.DSMT4">
+                <p:oleObj spid="_x0000_s307248" name="Equation" r:id="rId8" imgW="1650960" imgH="520560" progId="Equation.DSMT4">
                   <p:embed/>
                 </p:oleObj>
               </mc:Choice>
@@ -10781,7 +10773,7 @@
           <a:graphicData uri="http://schemas.openxmlformats.org/presentationml/2006/ole">
             <mc:AlternateContent xmlns:mc="http://schemas.openxmlformats.org/markup-compatibility/2006">
               <mc:Choice xmlns:v="urn:schemas-microsoft-com:vml" Requires="v">
-                <p:oleObj spid="_x0000_s307241" name="Equation" r:id="rId10" imgW="6413500" imgH="762000" progId="Equation.DSMT4">
+                <p:oleObj spid="_x0000_s307249" name="Equation" r:id="rId10" imgW="6413500" imgH="762000" progId="Equation.DSMT4">
                   <p:embed/>
                 </p:oleObj>
               </mc:Choice>
@@ -10851,7 +10843,7 @@
           <a:graphicData uri="http://schemas.openxmlformats.org/presentationml/2006/ole">
             <mc:AlternateContent xmlns:mc="http://schemas.openxmlformats.org/markup-compatibility/2006">
               <mc:Choice xmlns:v="urn:schemas-microsoft-com:vml" Requires="v">
-                <p:oleObj spid="_x0000_s307242" name="Equation" r:id="rId12" imgW="7175500" imgH="1612900" progId="Equation.DSMT4">
+                <p:oleObj spid="_x0000_s307250" name="Equation" r:id="rId12" imgW="7175500" imgH="1612900" progId="Equation.DSMT4">
                   <p:embed/>
                 </p:oleObj>
               </mc:Choice>
@@ -10915,7 +10907,7 @@
           <a:graphicData uri="http://schemas.openxmlformats.org/presentationml/2006/ole">
             <mc:AlternateContent xmlns:mc="http://schemas.openxmlformats.org/markup-compatibility/2006">
               <mc:Choice xmlns:v="urn:schemas-microsoft-com:vml" Requires="v">
-                <p:oleObj spid="_x0000_s307243" name="Equation" r:id="rId14" imgW="3047760" imgH="1193760" progId="Equation.DSMT4">
+                <p:oleObj spid="_x0000_s307251" name="Equation" r:id="rId14" imgW="3047760" imgH="1193760" progId="Equation.DSMT4">
                   <p:embed/>
                 </p:oleObj>
               </mc:Choice>
@@ -10991,7 +10983,7 @@
           <a:graphicData uri="http://schemas.openxmlformats.org/presentationml/2006/ole">
             <mc:AlternateContent xmlns:mc="http://schemas.openxmlformats.org/markup-compatibility/2006">
               <mc:Choice xmlns:v="urn:schemas-microsoft-com:vml" Requires="v">
-                <p:oleObj spid="_x0000_s307244" name="Equation" r:id="rId16" imgW="1422400" imgH="1409700" progId="Equation.DSMT4">
+                <p:oleObj spid="_x0000_s307252" name="Equation" r:id="rId16" imgW="1422400" imgH="1409700" progId="Equation.DSMT4">
                   <p:embed/>
                 </p:oleObj>
               </mc:Choice>
@@ -11708,7 +11700,7 @@
           <a:graphicData uri="http://schemas.openxmlformats.org/presentationml/2006/ole">
             <mc:AlternateContent xmlns:mc="http://schemas.openxmlformats.org/markup-compatibility/2006">
               <mc:Choice xmlns:v="urn:schemas-microsoft-com:vml" Requires="v">
-                <p:oleObj spid="_x0000_s43084" name="Equation" r:id="rId4" imgW="3987720" imgH="1244520" progId="Equation.DSMT4">
+                <p:oleObj spid="_x0000_s43087" name="Equation" r:id="rId4" imgW="3987720" imgH="1244520" progId="Equation.DSMT4">
                   <p:embed/>
                 </p:oleObj>
               </mc:Choice>
@@ -11784,7 +11776,7 @@
           <a:graphicData uri="http://schemas.openxmlformats.org/presentationml/2006/ole">
             <mc:AlternateContent xmlns:mc="http://schemas.openxmlformats.org/markup-compatibility/2006">
               <mc:Choice xmlns:v="urn:schemas-microsoft-com:vml" Requires="v">
-                <p:oleObj spid="_x0000_s43085" name="Equation" r:id="rId6" imgW="6451600" imgH="787400" progId="Equation.DSMT4">
+                <p:oleObj spid="_x0000_s43088" name="Equation" r:id="rId6" imgW="6451600" imgH="787400" progId="Equation.DSMT4">
                   <p:embed/>
                 </p:oleObj>
               </mc:Choice>
@@ -12488,7 +12480,7 @@
           <a:graphicData uri="http://schemas.openxmlformats.org/presentationml/2006/ole">
             <mc:AlternateContent xmlns:mc="http://schemas.openxmlformats.org/markup-compatibility/2006">
               <mc:Choice xmlns:v="urn:schemas-microsoft-com:vml" Requires="v">
-                <p:oleObj spid="_x0000_s190569" name="Equation" r:id="rId4" imgW="3987720" imgH="1244520" progId="Equation.DSMT4">
+                <p:oleObj spid="_x0000_s190573" name="Equation" r:id="rId4" imgW="3987720" imgH="1244520" progId="Equation.DSMT4">
                   <p:embed/>
                 </p:oleObj>
               </mc:Choice>
@@ -12564,7 +12556,7 @@
           <a:graphicData uri="http://schemas.openxmlformats.org/presentationml/2006/ole">
             <mc:AlternateContent xmlns:mc="http://schemas.openxmlformats.org/markup-compatibility/2006">
               <mc:Choice xmlns:v="urn:schemas-microsoft-com:vml" Requires="v">
-                <p:oleObj spid="_x0000_s190570" name="Equation" r:id="rId6" imgW="6451600" imgH="787400" progId="Equation.DSMT4">
+                <p:oleObj spid="_x0000_s190574" name="Equation" r:id="rId6" imgW="6451600" imgH="787400" progId="Equation.DSMT4">
                   <p:embed/>
                 </p:oleObj>
               </mc:Choice>
@@ -12634,7 +12626,7 @@
           <a:graphicData uri="http://schemas.openxmlformats.org/presentationml/2006/ole">
             <mc:AlternateContent xmlns:mc="http://schemas.openxmlformats.org/markup-compatibility/2006">
               <mc:Choice xmlns:v="urn:schemas-microsoft-com:vml" Requires="v">
-                <p:oleObj spid="_x0000_s190571" name="Equation" r:id="rId8" imgW="5321300" imgH="1511300" progId="Equation.DSMT4">
+                <p:oleObj spid="_x0000_s190575" name="Equation" r:id="rId8" imgW="5321300" imgH="1511300" progId="Equation.DSMT4">
                   <p:embed/>
                 </p:oleObj>
               </mc:Choice>

</xml_diff>